<commit_message>
add some information in make_our_help.org
</commit_message>
<xml_diff>
--- a/docs/tomoko/midterm_presen/mid_presen.pptx
+++ b/docs/tomoko/midterm_presen/mid_presen.pptx
@@ -5,7 +5,7 @@
     <p:sldMasterId id="2147483975" r:id="rId1"/>
   </p:sldMasterIdLst>
   <p:notesMasterIdLst>
-    <p:notesMasterId r:id="rId12"/>
+    <p:notesMasterId r:id="rId13"/>
   </p:notesMasterIdLst>
   <p:sldIdLst>
     <p:sldId id="256" r:id="rId2"/>
@@ -18,6 +18,7 @@
     <p:sldId id="265" r:id="rId9"/>
     <p:sldId id="263" r:id="rId10"/>
     <p:sldId id="258" r:id="rId11"/>
+    <p:sldId id="267" r:id="rId12"/>
   </p:sldIdLst>
   <p:sldSz cx="12192000" cy="6858000"/>
   <p:notesSz cx="6858000" cy="9144000"/>
@@ -206,7 +207,7 @@
           <a:p>
             <a:fld id="{BCF8B642-7FC1-E947-9552-A4615B252889}" type="datetimeFigureOut">
               <a:rPr kumimoji="1" lang="ja-JP" altLang="en-US" smtClean="0"/>
-              <a:t>2018/9/19</a:t>
+              <a:t>2018/9/28</a:t>
             </a:fld>
             <a:endParaRPr kumimoji="1" lang="ja-JP" altLang="en-US"/>
           </a:p>
@@ -1362,7 +1363,7 @@
             <a:fld id="{5586B75A-687E-405C-8A0B-8D00578BA2C3}" type="datetimeFigureOut">
               <a:rPr lang="en-US" smtClean="0"/>
               <a:pPr/>
-              <a:t>9/19/18</a:t>
+              <a:t>9/28/18</a:t>
             </a:fld>
             <a:endParaRPr lang="en-US" dirty="0"/>
           </a:p>
@@ -1569,7 +1570,7 @@
             <a:fld id="{5586B75A-687E-405C-8A0B-8D00578BA2C3}" type="datetimeFigureOut">
               <a:rPr lang="en-US" smtClean="0"/>
               <a:pPr/>
-              <a:t>9/19/18</a:t>
+              <a:t>9/28/18</a:t>
             </a:fld>
             <a:endParaRPr lang="en-US" dirty="0"/>
           </a:p>
@@ -1786,7 +1787,7 @@
             <a:fld id="{5586B75A-687E-405C-8A0B-8D00578BA2C3}" type="datetimeFigureOut">
               <a:rPr lang="en-US" smtClean="0"/>
               <a:pPr/>
-              <a:t>9/19/18</a:t>
+              <a:t>9/28/18</a:t>
             </a:fld>
             <a:endParaRPr lang="en-US" dirty="0"/>
           </a:p>
@@ -1993,7 +1994,7 @@
             <a:fld id="{5586B75A-687E-405C-8A0B-8D00578BA2C3}" type="datetimeFigureOut">
               <a:rPr lang="en-US" smtClean="0"/>
               <a:pPr/>
-              <a:t>9/19/18</a:t>
+              <a:t>9/28/18</a:t>
             </a:fld>
             <a:endParaRPr lang="en-US" dirty="0"/>
           </a:p>
@@ -2305,7 +2306,7 @@
             <a:fld id="{5586B75A-687E-405C-8A0B-8D00578BA2C3}" type="datetimeFigureOut">
               <a:rPr lang="en-US" smtClean="0"/>
               <a:pPr/>
-              <a:t>9/19/18</a:t>
+              <a:t>9/28/18</a:t>
             </a:fld>
             <a:endParaRPr lang="en-US" dirty="0"/>
           </a:p>
@@ -2586,7 +2587,7 @@
             <a:fld id="{5586B75A-687E-405C-8A0B-8D00578BA2C3}" type="datetimeFigureOut">
               <a:rPr lang="en-US" smtClean="0"/>
               <a:pPr/>
-              <a:t>9/19/18</a:t>
+              <a:t>9/28/18</a:t>
             </a:fld>
             <a:endParaRPr lang="en-US" dirty="0"/>
           </a:p>
@@ -3084,7 +3085,7 @@
             <a:fld id="{5586B75A-687E-405C-8A0B-8D00578BA2C3}" type="datetimeFigureOut">
               <a:rPr lang="en-US" smtClean="0"/>
               <a:pPr/>
-              <a:t>9/19/18</a:t>
+              <a:t>9/28/18</a:t>
             </a:fld>
             <a:endParaRPr lang="en-US" dirty="0"/>
           </a:p>
@@ -3227,7 +3228,7 @@
             <a:fld id="{5586B75A-687E-405C-8A0B-8D00578BA2C3}" type="datetimeFigureOut">
               <a:rPr lang="en-US" smtClean="0"/>
               <a:pPr/>
-              <a:t>9/19/18</a:t>
+              <a:t>9/28/18</a:t>
             </a:fld>
             <a:endParaRPr lang="en-US" dirty="0"/>
           </a:p>
@@ -3342,7 +3343,7 @@
             <a:fld id="{5586B75A-687E-405C-8A0B-8D00578BA2C3}" type="datetimeFigureOut">
               <a:rPr lang="en-US" smtClean="0"/>
               <a:pPr/>
-              <a:t>9/19/18</a:t>
+              <a:t>9/28/18</a:t>
             </a:fld>
             <a:endParaRPr lang="en-US" dirty="0"/>
           </a:p>
@@ -3697,7 +3698,7 @@
             <a:fld id="{5586B75A-687E-405C-8A0B-8D00578BA2C3}" type="datetimeFigureOut">
               <a:rPr lang="en-US" smtClean="0"/>
               <a:pPr/>
-              <a:t>9/19/18</a:t>
+              <a:t>9/28/18</a:t>
             </a:fld>
             <a:endParaRPr lang="en-US" dirty="0"/>
           </a:p>
@@ -4022,7 +4023,7 @@
             <a:fld id="{5586B75A-687E-405C-8A0B-8D00578BA2C3}" type="datetimeFigureOut">
               <a:rPr lang="en-US" smtClean="0"/>
               <a:pPr/>
-              <a:t>9/19/18</a:t>
+              <a:t>9/28/18</a:t>
             </a:fld>
             <a:endParaRPr lang="en-US" dirty="0"/>
           </a:p>
@@ -4273,7 +4274,7 @@
             <a:fld id="{5586B75A-687E-405C-8A0B-8D00578BA2C3}" type="datetimeFigureOut">
               <a:rPr lang="en-US" smtClean="0"/>
               <a:pPr/>
-              <a:t>9/19/18</a:t>
+              <a:t>9/28/18</a:t>
             </a:fld>
             <a:endParaRPr lang="en-US" dirty="0"/>
           </a:p>
@@ -5270,6 +5271,645 @@
     <p:extLst>
       <p:ext uri="{BB962C8B-B14F-4D97-AF65-F5344CB8AC3E}">
         <p14:creationId xmlns:p14="http://schemas.microsoft.com/office/powerpoint/2010/main" val="3302818942"/>
+      </p:ext>
+    </p:extLst>
+  </p:cSld>
+  <p:clrMapOvr>
+    <a:masterClrMapping/>
+  </p:clrMapOvr>
+</p:sld>
+</file>
+
+<file path=ppt/slides/slide11.xml><?xml version="1.0" encoding="utf-8"?>
+<p:sld xmlns:a="http://schemas.openxmlformats.org/drawingml/2006/main" xmlns:r="http://schemas.openxmlformats.org/officeDocument/2006/relationships" xmlns:p="http://schemas.openxmlformats.org/presentationml/2006/main">
+  <p:cSld>
+    <p:spTree>
+      <p:nvGrpSpPr>
+        <p:cNvPr id="1" name=""/>
+        <p:cNvGrpSpPr/>
+        <p:nvPr/>
+      </p:nvGrpSpPr>
+      <p:grpSpPr>
+        <a:xfrm>
+          <a:off x="0" y="0"/>
+          <a:ext cx="0" cy="0"/>
+          <a:chOff x="0" y="0"/>
+          <a:chExt cx="0" cy="0"/>
+        </a:xfrm>
+      </p:grpSpPr>
+      <p:sp>
+        <p:nvSpPr>
+          <p:cNvPr id="2" name="正方形/長方形 1">
+            <a:extLst>
+              <a:ext uri="{FF2B5EF4-FFF2-40B4-BE49-F238E27FC236}">
+                <a16:creationId xmlns:a16="http://schemas.microsoft.com/office/drawing/2014/main" id="{4D9F04BC-73DA-054A-A84B-20758AF85362}"/>
+              </a:ext>
+            </a:extLst>
+          </p:cNvPr>
+          <p:cNvSpPr/>
+          <p:nvPr/>
+        </p:nvSpPr>
+        <p:spPr>
+          <a:xfrm>
+            <a:off x="4137285" y="2689457"/>
+            <a:ext cx="3657600" cy="1244184"/>
+          </a:xfrm>
+          <a:prstGeom prst="rect">
+            <a:avLst/>
+          </a:prstGeom>
+          <a:solidFill>
+            <a:schemeClr val="tx1"/>
+          </a:solidFill>
+          <a:ln>
+            <a:solidFill>
+              <a:schemeClr val="tx1"/>
+            </a:solidFill>
+          </a:ln>
+        </p:spPr>
+        <p:style>
+          <a:lnRef idx="2">
+            <a:schemeClr val="accent1">
+              <a:shade val="50000"/>
+            </a:schemeClr>
+          </a:lnRef>
+          <a:fillRef idx="1">
+            <a:schemeClr val="accent1"/>
+          </a:fillRef>
+          <a:effectRef idx="0">
+            <a:schemeClr val="accent1"/>
+          </a:effectRef>
+          <a:fontRef idx="minor">
+            <a:schemeClr val="lt1"/>
+          </a:fontRef>
+        </p:style>
+        <p:txBody>
+          <a:bodyPr rtlCol="0" anchor="ctr"/>
+          <a:lstStyle/>
+          <a:p>
+            <a:pPr algn="ctr"/>
+            <a:r>
+              <a:rPr kumimoji="1" lang="en-US" altLang="ja-JP" sz="4800" dirty="0" err="1"/>
+              <a:t>Github</a:t>
+            </a:r>
+            <a:endParaRPr kumimoji="1" lang="ja-JP" altLang="en-US" sz="4800"/>
+          </a:p>
+        </p:txBody>
+      </p:sp>
+      <p:sp>
+        <p:nvSpPr>
+          <p:cNvPr id="11" name="円/楕円 10">
+            <a:extLst>
+              <a:ext uri="{FF2B5EF4-FFF2-40B4-BE49-F238E27FC236}">
+                <a16:creationId xmlns:a16="http://schemas.microsoft.com/office/drawing/2014/main" id="{DA767661-5B5B-6C4C-A73D-7703EB9D4F0B}"/>
+              </a:ext>
+            </a:extLst>
+          </p:cNvPr>
+          <p:cNvSpPr/>
+          <p:nvPr/>
+        </p:nvSpPr>
+        <p:spPr>
+          <a:xfrm>
+            <a:off x="221105" y="5354273"/>
+            <a:ext cx="2575883" cy="1064302"/>
+          </a:xfrm>
+          <a:prstGeom prst="ellipse">
+            <a:avLst/>
+          </a:prstGeom>
+          <a:solidFill>
+            <a:schemeClr val="accent2"/>
+          </a:solidFill>
+          <a:ln>
+            <a:noFill/>
+          </a:ln>
+        </p:spPr>
+        <p:style>
+          <a:lnRef idx="2">
+            <a:schemeClr val="accent1">
+              <a:shade val="50000"/>
+            </a:schemeClr>
+          </a:lnRef>
+          <a:fillRef idx="1">
+            <a:schemeClr val="accent1"/>
+          </a:fillRef>
+          <a:effectRef idx="0">
+            <a:schemeClr val="accent1"/>
+          </a:effectRef>
+          <a:fontRef idx="minor">
+            <a:schemeClr val="lt1"/>
+          </a:fontRef>
+        </p:style>
+        <p:txBody>
+          <a:bodyPr rtlCol="0" anchor="ctr"/>
+          <a:lstStyle/>
+          <a:p>
+            <a:pPr algn="ctr"/>
+            <a:r>
+              <a:rPr kumimoji="1" lang="en-US" altLang="ja-JP" sz="3200" dirty="0" err="1"/>
+              <a:t>my_help</a:t>
+            </a:r>
+            <a:endParaRPr kumimoji="1" lang="ja-JP" altLang="en-US" sz="3200"/>
+          </a:p>
+        </p:txBody>
+      </p:sp>
+      <p:sp>
+        <p:nvSpPr>
+          <p:cNvPr id="12" name="円/楕円 11">
+            <a:extLst>
+              <a:ext uri="{FF2B5EF4-FFF2-40B4-BE49-F238E27FC236}">
+                <a16:creationId xmlns:a16="http://schemas.microsoft.com/office/drawing/2014/main" id="{B60093AF-3556-024F-A1BF-DEB61375AE20}"/>
+              </a:ext>
+            </a:extLst>
+          </p:cNvPr>
+          <p:cNvSpPr/>
+          <p:nvPr/>
+        </p:nvSpPr>
+        <p:spPr>
+          <a:xfrm>
+            <a:off x="3264107" y="5689203"/>
+            <a:ext cx="2491233" cy="1064302"/>
+          </a:xfrm>
+          <a:prstGeom prst="ellipse">
+            <a:avLst/>
+          </a:prstGeom>
+          <a:solidFill>
+            <a:schemeClr val="accent2"/>
+          </a:solidFill>
+          <a:ln>
+            <a:noFill/>
+          </a:ln>
+        </p:spPr>
+        <p:style>
+          <a:lnRef idx="2">
+            <a:schemeClr val="accent1">
+              <a:shade val="50000"/>
+            </a:schemeClr>
+          </a:lnRef>
+          <a:fillRef idx="1">
+            <a:schemeClr val="accent1"/>
+          </a:fillRef>
+          <a:effectRef idx="0">
+            <a:schemeClr val="accent1"/>
+          </a:effectRef>
+          <a:fontRef idx="minor">
+            <a:schemeClr val="lt1"/>
+          </a:fontRef>
+        </p:style>
+        <p:txBody>
+          <a:bodyPr rtlCol="0" anchor="ctr"/>
+          <a:lstStyle/>
+          <a:p>
+            <a:pPr algn="ctr"/>
+            <a:r>
+              <a:rPr kumimoji="1" lang="en-US" altLang="ja-JP" sz="3200" dirty="0" err="1"/>
+              <a:t>my_help</a:t>
+            </a:r>
+            <a:endParaRPr kumimoji="1" lang="ja-JP" altLang="en-US" sz="3200"/>
+          </a:p>
+        </p:txBody>
+      </p:sp>
+      <p:sp>
+        <p:nvSpPr>
+          <p:cNvPr id="13" name="円/楕円 12">
+            <a:extLst>
+              <a:ext uri="{FF2B5EF4-FFF2-40B4-BE49-F238E27FC236}">
+                <a16:creationId xmlns:a16="http://schemas.microsoft.com/office/drawing/2014/main" id="{556BDC2D-3EBC-FB42-8085-E68656C0D3FC}"/>
+              </a:ext>
+            </a:extLst>
+          </p:cNvPr>
+          <p:cNvSpPr/>
+          <p:nvPr/>
+        </p:nvSpPr>
+        <p:spPr>
+          <a:xfrm>
+            <a:off x="6640897" y="5671274"/>
+            <a:ext cx="2467243" cy="1064302"/>
+          </a:xfrm>
+          <a:prstGeom prst="ellipse">
+            <a:avLst/>
+          </a:prstGeom>
+          <a:solidFill>
+            <a:schemeClr val="accent2"/>
+          </a:solidFill>
+          <a:ln>
+            <a:noFill/>
+          </a:ln>
+        </p:spPr>
+        <p:style>
+          <a:lnRef idx="2">
+            <a:schemeClr val="accent1">
+              <a:shade val="50000"/>
+            </a:schemeClr>
+          </a:lnRef>
+          <a:fillRef idx="1">
+            <a:schemeClr val="accent1"/>
+          </a:fillRef>
+          <a:effectRef idx="0">
+            <a:schemeClr val="accent1"/>
+          </a:effectRef>
+          <a:fontRef idx="minor">
+            <a:schemeClr val="lt1"/>
+          </a:fontRef>
+        </p:style>
+        <p:txBody>
+          <a:bodyPr rtlCol="0" anchor="ctr"/>
+          <a:lstStyle/>
+          <a:p>
+            <a:pPr algn="ctr"/>
+            <a:r>
+              <a:rPr kumimoji="1" lang="en-US" altLang="ja-JP" sz="3200" dirty="0" err="1"/>
+              <a:t>my_help</a:t>
+            </a:r>
+            <a:endParaRPr kumimoji="1" lang="ja-JP" altLang="en-US" sz="3200"/>
+          </a:p>
+        </p:txBody>
+      </p:sp>
+      <p:sp>
+        <p:nvSpPr>
+          <p:cNvPr id="14" name="円/楕円 13">
+            <a:extLst>
+              <a:ext uri="{FF2B5EF4-FFF2-40B4-BE49-F238E27FC236}">
+                <a16:creationId xmlns:a16="http://schemas.microsoft.com/office/drawing/2014/main" id="{15122CF5-290E-3540-87B0-FF661465AAEC}"/>
+              </a:ext>
+            </a:extLst>
+          </p:cNvPr>
+          <p:cNvSpPr/>
+          <p:nvPr/>
+        </p:nvSpPr>
+        <p:spPr>
+          <a:xfrm>
+            <a:off x="9395012" y="5246697"/>
+            <a:ext cx="2604614" cy="1064302"/>
+          </a:xfrm>
+          <a:prstGeom prst="ellipse">
+            <a:avLst/>
+          </a:prstGeom>
+          <a:solidFill>
+            <a:schemeClr val="accent2"/>
+          </a:solidFill>
+          <a:ln>
+            <a:noFill/>
+          </a:ln>
+        </p:spPr>
+        <p:style>
+          <a:lnRef idx="2">
+            <a:schemeClr val="accent1">
+              <a:shade val="50000"/>
+            </a:schemeClr>
+          </a:lnRef>
+          <a:fillRef idx="1">
+            <a:schemeClr val="accent1"/>
+          </a:fillRef>
+          <a:effectRef idx="0">
+            <a:schemeClr val="accent1"/>
+          </a:effectRef>
+          <a:fontRef idx="minor">
+            <a:schemeClr val="lt1"/>
+          </a:fontRef>
+        </p:style>
+        <p:txBody>
+          <a:bodyPr rtlCol="0" anchor="ctr"/>
+          <a:lstStyle/>
+          <a:p>
+            <a:pPr algn="ctr"/>
+            <a:r>
+              <a:rPr kumimoji="1" lang="en-US" altLang="ja-JP" sz="3200" dirty="0" err="1"/>
+              <a:t>my_help</a:t>
+            </a:r>
+            <a:endParaRPr kumimoji="1" lang="ja-JP" altLang="en-US" sz="3200"/>
+          </a:p>
+        </p:txBody>
+      </p:sp>
+      <p:sp>
+        <p:nvSpPr>
+          <p:cNvPr id="17" name="上矢印 16">
+            <a:extLst>
+              <a:ext uri="{FF2B5EF4-FFF2-40B4-BE49-F238E27FC236}">
+                <a16:creationId xmlns:a16="http://schemas.microsoft.com/office/drawing/2014/main" id="{E143C53C-9E81-0E4B-A117-768ECDD9EDD1}"/>
+              </a:ext>
+            </a:extLst>
+          </p:cNvPr>
+          <p:cNvSpPr/>
+          <p:nvPr/>
+        </p:nvSpPr>
+        <p:spPr>
+          <a:xfrm rot="3378195">
+            <a:off x="2732444" y="3669249"/>
+            <a:ext cx="253122" cy="1877941"/>
+          </a:xfrm>
+          <a:prstGeom prst="upArrow">
+            <a:avLst>
+              <a:gd name="adj1" fmla="val 50000"/>
+              <a:gd name="adj2" fmla="val 48363"/>
+            </a:avLst>
+          </a:prstGeom>
+          <a:ln>
+            <a:noFill/>
+          </a:ln>
+        </p:spPr>
+        <p:style>
+          <a:lnRef idx="2">
+            <a:schemeClr val="accent1">
+              <a:shade val="50000"/>
+            </a:schemeClr>
+          </a:lnRef>
+          <a:fillRef idx="1">
+            <a:schemeClr val="accent1"/>
+          </a:fillRef>
+          <a:effectRef idx="0">
+            <a:schemeClr val="accent1"/>
+          </a:effectRef>
+          <a:fontRef idx="minor">
+            <a:schemeClr val="lt1"/>
+          </a:fontRef>
+        </p:style>
+        <p:txBody>
+          <a:bodyPr rtlCol="0" anchor="ctr"/>
+          <a:lstStyle/>
+          <a:p>
+            <a:pPr algn="ctr"/>
+            <a:endParaRPr kumimoji="1" lang="ja-JP" altLang="en-US"/>
+          </a:p>
+        </p:txBody>
+      </p:sp>
+      <p:sp>
+        <p:nvSpPr>
+          <p:cNvPr id="22" name="上矢印 21">
+            <a:extLst>
+              <a:ext uri="{FF2B5EF4-FFF2-40B4-BE49-F238E27FC236}">
+                <a16:creationId xmlns:a16="http://schemas.microsoft.com/office/drawing/2014/main" id="{62440CE0-008E-9445-B57B-7E0B9581FE19}"/>
+              </a:ext>
+            </a:extLst>
+          </p:cNvPr>
+          <p:cNvSpPr/>
+          <p:nvPr/>
+        </p:nvSpPr>
+        <p:spPr>
+          <a:xfrm rot="20078240">
+            <a:off x="6953210" y="4149334"/>
+            <a:ext cx="288175" cy="1523062"/>
+          </a:xfrm>
+          <a:prstGeom prst="upArrow">
+            <a:avLst>
+              <a:gd name="adj1" fmla="val 50000"/>
+              <a:gd name="adj2" fmla="val 48363"/>
+            </a:avLst>
+          </a:prstGeom>
+          <a:ln>
+            <a:noFill/>
+          </a:ln>
+        </p:spPr>
+        <p:style>
+          <a:lnRef idx="2">
+            <a:schemeClr val="accent1">
+              <a:shade val="50000"/>
+            </a:schemeClr>
+          </a:lnRef>
+          <a:fillRef idx="1">
+            <a:schemeClr val="accent1"/>
+          </a:fillRef>
+          <a:effectRef idx="0">
+            <a:schemeClr val="accent1"/>
+          </a:effectRef>
+          <a:fontRef idx="minor">
+            <a:schemeClr val="lt1"/>
+          </a:fontRef>
+        </p:style>
+        <p:txBody>
+          <a:bodyPr rtlCol="0" anchor="ctr"/>
+          <a:lstStyle/>
+          <a:p>
+            <a:pPr algn="ctr"/>
+            <a:endParaRPr kumimoji="1" lang="ja-JP" altLang="en-US"/>
+          </a:p>
+        </p:txBody>
+      </p:sp>
+      <p:sp>
+        <p:nvSpPr>
+          <p:cNvPr id="24" name="上矢印 23">
+            <a:extLst>
+              <a:ext uri="{FF2B5EF4-FFF2-40B4-BE49-F238E27FC236}">
+                <a16:creationId xmlns:a16="http://schemas.microsoft.com/office/drawing/2014/main" id="{2732DC8B-5E71-4242-8463-BD08B81E0602}"/>
+              </a:ext>
+            </a:extLst>
+          </p:cNvPr>
+          <p:cNvSpPr/>
+          <p:nvPr/>
+        </p:nvSpPr>
+        <p:spPr>
+          <a:xfrm rot="18575735">
+            <a:off x="9302301" y="3804170"/>
+            <a:ext cx="247003" cy="1775791"/>
+          </a:xfrm>
+          <a:prstGeom prst="upArrow">
+            <a:avLst>
+              <a:gd name="adj1" fmla="val 50000"/>
+              <a:gd name="adj2" fmla="val 48363"/>
+            </a:avLst>
+          </a:prstGeom>
+          <a:ln>
+            <a:noFill/>
+          </a:ln>
+        </p:spPr>
+        <p:style>
+          <a:lnRef idx="2">
+            <a:schemeClr val="accent1">
+              <a:shade val="50000"/>
+            </a:schemeClr>
+          </a:lnRef>
+          <a:fillRef idx="1">
+            <a:schemeClr val="accent1"/>
+          </a:fillRef>
+          <a:effectRef idx="0">
+            <a:schemeClr val="accent1"/>
+          </a:effectRef>
+          <a:fontRef idx="minor">
+            <a:schemeClr val="lt1"/>
+          </a:fontRef>
+        </p:style>
+        <p:txBody>
+          <a:bodyPr rtlCol="0" anchor="ctr"/>
+          <a:lstStyle/>
+          <a:p>
+            <a:pPr algn="ctr"/>
+            <a:endParaRPr kumimoji="1" lang="ja-JP" altLang="en-US"/>
+          </a:p>
+        </p:txBody>
+      </p:sp>
+      <p:sp>
+        <p:nvSpPr>
+          <p:cNvPr id="25" name="上矢印 24">
+            <a:extLst>
+              <a:ext uri="{FF2B5EF4-FFF2-40B4-BE49-F238E27FC236}">
+                <a16:creationId xmlns:a16="http://schemas.microsoft.com/office/drawing/2014/main" id="{BFC53314-25B7-AE46-8F73-D941FC91D55D}"/>
+              </a:ext>
+            </a:extLst>
+          </p:cNvPr>
+          <p:cNvSpPr/>
+          <p:nvPr/>
+        </p:nvSpPr>
+        <p:spPr>
+          <a:xfrm rot="1784973">
+            <a:off x="4821518" y="4162569"/>
+            <a:ext cx="248205" cy="1523062"/>
+          </a:xfrm>
+          <a:prstGeom prst="upArrow">
+            <a:avLst>
+              <a:gd name="adj1" fmla="val 50000"/>
+              <a:gd name="adj2" fmla="val 48363"/>
+            </a:avLst>
+          </a:prstGeom>
+          <a:ln>
+            <a:noFill/>
+          </a:ln>
+        </p:spPr>
+        <p:style>
+          <a:lnRef idx="2">
+            <a:schemeClr val="accent1">
+              <a:shade val="50000"/>
+            </a:schemeClr>
+          </a:lnRef>
+          <a:fillRef idx="1">
+            <a:schemeClr val="accent1"/>
+          </a:fillRef>
+          <a:effectRef idx="0">
+            <a:schemeClr val="accent1"/>
+          </a:effectRef>
+          <a:fontRef idx="minor">
+            <a:schemeClr val="lt1"/>
+          </a:fontRef>
+        </p:style>
+        <p:txBody>
+          <a:bodyPr rtlCol="0" anchor="ctr"/>
+          <a:lstStyle/>
+          <a:p>
+            <a:pPr algn="ctr"/>
+            <a:endParaRPr kumimoji="1" lang="ja-JP" altLang="en-US"/>
+          </a:p>
+        </p:txBody>
+      </p:sp>
+      <p:sp>
+        <p:nvSpPr>
+          <p:cNvPr id="26" name="雲 25">
+            <a:extLst>
+              <a:ext uri="{FF2B5EF4-FFF2-40B4-BE49-F238E27FC236}">
+                <a16:creationId xmlns:a16="http://schemas.microsoft.com/office/drawing/2014/main" id="{7B3C1FBA-BE80-2A4B-98D5-B38367E47758}"/>
+              </a:ext>
+            </a:extLst>
+          </p:cNvPr>
+          <p:cNvSpPr/>
+          <p:nvPr/>
+        </p:nvSpPr>
+        <p:spPr>
+          <a:xfrm>
+            <a:off x="3396838" y="212821"/>
+            <a:ext cx="5692515" cy="2079812"/>
+          </a:xfrm>
+          <a:prstGeom prst="cloud">
+            <a:avLst/>
+          </a:prstGeom>
+          <a:solidFill>
+            <a:schemeClr val="accent5">
+              <a:lumMod val="40000"/>
+              <a:lumOff val="60000"/>
+            </a:schemeClr>
+          </a:solidFill>
+          <a:ln>
+            <a:noFill/>
+          </a:ln>
+        </p:spPr>
+        <p:style>
+          <a:lnRef idx="2">
+            <a:schemeClr val="accent1">
+              <a:shade val="50000"/>
+            </a:schemeClr>
+          </a:lnRef>
+          <a:fillRef idx="1">
+            <a:schemeClr val="accent1"/>
+          </a:fillRef>
+          <a:effectRef idx="0">
+            <a:schemeClr val="accent1"/>
+          </a:effectRef>
+          <a:fontRef idx="minor">
+            <a:schemeClr val="lt1"/>
+          </a:fontRef>
+        </p:style>
+        <p:txBody>
+          <a:bodyPr rtlCol="0" anchor="ctr"/>
+          <a:lstStyle/>
+          <a:p>
+            <a:pPr algn="ctr"/>
+            <a:r>
+              <a:rPr kumimoji="1" lang="en-US" altLang="ja-JP" sz="8000" dirty="0">
+                <a:solidFill>
+                  <a:schemeClr val="tx1"/>
+                </a:solidFill>
+              </a:rPr>
+              <a:t>web</a:t>
+            </a:r>
+            <a:endParaRPr kumimoji="1" lang="ja-JP" altLang="en-US" sz="8000">
+              <a:solidFill>
+                <a:schemeClr val="tx1"/>
+              </a:solidFill>
+            </a:endParaRPr>
+          </a:p>
+        </p:txBody>
+      </p:sp>
+      <p:sp>
+        <p:nvSpPr>
+          <p:cNvPr id="27" name="上矢印 26">
+            <a:extLst>
+              <a:ext uri="{FF2B5EF4-FFF2-40B4-BE49-F238E27FC236}">
+                <a16:creationId xmlns:a16="http://schemas.microsoft.com/office/drawing/2014/main" id="{0E2D6C9F-F71F-BE49-9829-265BAE008374}"/>
+              </a:ext>
+            </a:extLst>
+          </p:cNvPr>
+          <p:cNvSpPr/>
+          <p:nvPr/>
+        </p:nvSpPr>
+        <p:spPr>
+          <a:xfrm>
+            <a:off x="4924316" y="1987832"/>
+            <a:ext cx="2372097" cy="896471"/>
+          </a:xfrm>
+          <a:prstGeom prst="upArrow">
+            <a:avLst/>
+          </a:prstGeom>
+          <a:solidFill>
+            <a:srgbClr val="FF0000"/>
+          </a:solidFill>
+          <a:ln>
+            <a:noFill/>
+          </a:ln>
+        </p:spPr>
+        <p:style>
+          <a:lnRef idx="2">
+            <a:schemeClr val="accent1">
+              <a:shade val="50000"/>
+            </a:schemeClr>
+          </a:lnRef>
+          <a:fillRef idx="1">
+            <a:schemeClr val="accent1"/>
+          </a:fillRef>
+          <a:effectRef idx="0">
+            <a:schemeClr val="accent1"/>
+          </a:effectRef>
+          <a:fontRef idx="minor">
+            <a:schemeClr val="lt1"/>
+          </a:fontRef>
+        </p:style>
+        <p:txBody>
+          <a:bodyPr rtlCol="0" anchor="ctr"/>
+          <a:lstStyle/>
+          <a:p>
+            <a:pPr algn="ctr"/>
+            <a:endParaRPr kumimoji="1" lang="ja-JP" altLang="en-US"/>
+          </a:p>
+        </p:txBody>
+      </p:sp>
+    </p:spTree>
+    <p:extLst>
+      <p:ext uri="{BB962C8B-B14F-4D97-AF65-F5344CB8AC3E}">
+        <p14:creationId xmlns:p14="http://schemas.microsoft.com/office/powerpoint/2010/main" val="2516973983"/>
       </p:ext>
     </p:extLst>
   </p:cSld>

</xml_diff>